<commit_message>
changed recmodulepredicate and eligiblemodulepredicate to take in ReadOnlyGradTrak instead of GradTrak; updated the interface and test accordingly
</commit_message>
<xml_diff>
--- a/docs/diagrams/RecModulePredicateSequenceDiagram.pptx
+++ b/docs/diagrams/RecModulePredicateSequenceDiagram.pptx
@@ -193,7 +193,7 @@
             <a:fld id="{6F7805A1-8E5A-4F04-B29D-69AA293D755B}" type="datetimeFigureOut">
               <a:rPr lang="en-SG" smtClean="0"/>
               <a:pPr/>
-              <a:t>12/4/2019</a:t>
+              <a:t>15/4/2019</a:t>
             </a:fld>
             <a:endParaRPr lang="en-SG" dirty="0"/>
           </a:p>
@@ -723,7 +723,7 @@
             <a:fld id="{E03380C4-F1D8-4404-82A1-426FFD458098}" type="datetimeFigureOut">
               <a:rPr lang="en-SG" smtClean="0"/>
               <a:pPr/>
-              <a:t>12/4/2019</a:t>
+              <a:t>15/4/2019</a:t>
             </a:fld>
             <a:endParaRPr lang="en-SG" dirty="0"/>
           </a:p>
@@ -890,7 +890,7 @@
             <a:fld id="{E03380C4-F1D8-4404-82A1-426FFD458098}" type="datetimeFigureOut">
               <a:rPr lang="en-SG" smtClean="0"/>
               <a:pPr/>
-              <a:t>12/4/2019</a:t>
+              <a:t>15/4/2019</a:t>
             </a:fld>
             <a:endParaRPr lang="en-SG" dirty="0"/>
           </a:p>
@@ -1067,7 +1067,7 @@
             <a:fld id="{E03380C4-F1D8-4404-82A1-426FFD458098}" type="datetimeFigureOut">
               <a:rPr lang="en-SG" smtClean="0"/>
               <a:pPr/>
-              <a:t>12/4/2019</a:t>
+              <a:t>15/4/2019</a:t>
             </a:fld>
             <a:endParaRPr lang="en-SG" dirty="0"/>
           </a:p>
@@ -1234,7 +1234,7 @@
             <a:fld id="{E03380C4-F1D8-4404-82A1-426FFD458098}" type="datetimeFigureOut">
               <a:rPr lang="en-SG" smtClean="0"/>
               <a:pPr/>
-              <a:t>12/4/2019</a:t>
+              <a:t>15/4/2019</a:t>
             </a:fld>
             <a:endParaRPr lang="en-SG" dirty="0"/>
           </a:p>
@@ -1477,7 +1477,7 @@
             <a:fld id="{E03380C4-F1D8-4404-82A1-426FFD458098}" type="datetimeFigureOut">
               <a:rPr lang="en-SG" smtClean="0"/>
               <a:pPr/>
-              <a:t>12/4/2019</a:t>
+              <a:t>15/4/2019</a:t>
             </a:fld>
             <a:endParaRPr lang="en-SG" dirty="0"/>
           </a:p>
@@ -1762,7 +1762,7 @@
             <a:fld id="{E03380C4-F1D8-4404-82A1-426FFD458098}" type="datetimeFigureOut">
               <a:rPr lang="en-SG" smtClean="0"/>
               <a:pPr/>
-              <a:t>12/4/2019</a:t>
+              <a:t>15/4/2019</a:t>
             </a:fld>
             <a:endParaRPr lang="en-SG" dirty="0"/>
           </a:p>
@@ -2181,7 +2181,7 @@
             <a:fld id="{E03380C4-F1D8-4404-82A1-426FFD458098}" type="datetimeFigureOut">
               <a:rPr lang="en-SG" smtClean="0"/>
               <a:pPr/>
-              <a:t>12/4/2019</a:t>
+              <a:t>15/4/2019</a:t>
             </a:fld>
             <a:endParaRPr lang="en-SG" dirty="0"/>
           </a:p>
@@ -2296,7 +2296,7 @@
             <a:fld id="{E03380C4-F1D8-4404-82A1-426FFD458098}" type="datetimeFigureOut">
               <a:rPr lang="en-SG" smtClean="0"/>
               <a:pPr/>
-              <a:t>12/4/2019</a:t>
+              <a:t>15/4/2019</a:t>
             </a:fld>
             <a:endParaRPr lang="en-SG" dirty="0"/>
           </a:p>
@@ -2388,7 +2388,7 @@
             <a:fld id="{E03380C4-F1D8-4404-82A1-426FFD458098}" type="datetimeFigureOut">
               <a:rPr lang="en-SG" smtClean="0"/>
               <a:pPr/>
-              <a:t>12/4/2019</a:t>
+              <a:t>15/4/2019</a:t>
             </a:fld>
             <a:endParaRPr lang="en-SG" dirty="0"/>
           </a:p>
@@ -2662,7 +2662,7 @@
             <a:fld id="{E03380C4-F1D8-4404-82A1-426FFD458098}" type="datetimeFigureOut">
               <a:rPr lang="en-SG" smtClean="0"/>
               <a:pPr/>
-              <a:t>12/4/2019</a:t>
+              <a:t>15/4/2019</a:t>
             </a:fld>
             <a:endParaRPr lang="en-SG" dirty="0"/>
           </a:p>
@@ -2912,7 +2912,7 @@
             <a:fld id="{E03380C4-F1D8-4404-82A1-426FFD458098}" type="datetimeFigureOut">
               <a:rPr lang="en-SG" smtClean="0"/>
               <a:pPr/>
-              <a:t>12/4/2019</a:t>
+              <a:t>15/4/2019</a:t>
             </a:fld>
             <a:endParaRPr lang="en-SG" dirty="0"/>
           </a:p>
@@ -3122,7 +3122,7 @@
             <a:fld id="{E03380C4-F1D8-4404-82A1-426FFD458098}" type="datetimeFigureOut">
               <a:rPr lang="en-SG" smtClean="0"/>
               <a:pPr/>
-              <a:t>12/4/2019</a:t>
+              <a:t>15/4/2019</a:t>
             </a:fld>
             <a:endParaRPr lang="en-SG" dirty="0"/>
           </a:p>
@@ -4002,8 +4002,8 @@
         </p:nvSpPr>
         <p:spPr>
           <a:xfrm>
-            <a:off x="4076452" y="5445224"/>
-            <a:ext cx="1224136" cy="335427"/>
+            <a:off x="4076452" y="5229200"/>
+            <a:ext cx="1224136" cy="551451"/>
           </a:xfrm>
           <a:prstGeom prst="rect">
             <a:avLst/>
@@ -4043,7 +4043,7 @@
                   <a:schemeClr val="bg1"/>
                 </a:solidFill>
               </a:rPr>
-              <a:t>gt:GradTrak</a:t>
+              <a:t>gt:ReadOnlyGradTrak</a:t>
             </a:r>
             <a:endParaRPr lang="en-SG" sz="1600" dirty="0">
               <a:solidFill>
@@ -4299,7 +4299,7 @@
           <p:cNvPr id="39" name="Straight Connector 38">
             <a:extLst>
               <a:ext uri="{FF2B5EF4-FFF2-40B4-BE49-F238E27FC236}">
-                <a16:creationId xmlns:a16="http://schemas.microsoft.com/office/drawing/2014/main" xmlns="" id="{E4E1C8CA-49DF-45D8-80A5-D5C8282EE927}"/>
+                <a16:creationId xmlns="" xmlns:a16="http://schemas.microsoft.com/office/drawing/2014/main" id="{E4E1C8CA-49DF-45D8-80A5-D5C8282EE927}"/>
               </a:ext>
             </a:extLst>
           </p:cNvPr>
@@ -4382,7 +4382,7 @@
           <p:cNvPr id="43" name="Straight Arrow Connector 42">
             <a:extLst>
               <a:ext uri="{FF2B5EF4-FFF2-40B4-BE49-F238E27FC236}">
-                <a16:creationId xmlns:a16="http://schemas.microsoft.com/office/drawing/2014/main" xmlns="" id="{7C9F21BC-13A9-471F-825A-2621FD36355F}"/>
+                <a16:creationId xmlns="" xmlns:a16="http://schemas.microsoft.com/office/drawing/2014/main" id="{7C9F21BC-13A9-471F-825A-2621FD36355F}"/>
               </a:ext>
             </a:extLst>
           </p:cNvPr>
@@ -4428,7 +4428,7 @@
           <p:cNvPr id="44" name="Straight Arrow Connector 43">
             <a:extLst>
               <a:ext uri="{FF2B5EF4-FFF2-40B4-BE49-F238E27FC236}">
-                <a16:creationId xmlns:a16="http://schemas.microsoft.com/office/drawing/2014/main" xmlns="" id="{7C9F21BC-13A9-471F-825A-2621FD36355F}"/>
+                <a16:creationId xmlns="" xmlns:a16="http://schemas.microsoft.com/office/drawing/2014/main" id="{7C9F21BC-13A9-471F-825A-2621FD36355F}"/>
               </a:ext>
             </a:extLst>
           </p:cNvPr>
@@ -4814,7 +4814,7 @@
           <p:cNvPr id="71" name="Straight Arrow Connector 70">
             <a:extLst>
               <a:ext uri="{FF2B5EF4-FFF2-40B4-BE49-F238E27FC236}">
-                <a16:creationId xmlns:a16="http://schemas.microsoft.com/office/drawing/2014/main" xmlns="" id="{7C9F21BC-13A9-471F-825A-2621FD36355F}"/>
+                <a16:creationId xmlns="" xmlns:a16="http://schemas.microsoft.com/office/drawing/2014/main" id="{7C9F21BC-13A9-471F-825A-2621FD36355F}"/>
               </a:ext>
             </a:extLst>
           </p:cNvPr>
@@ -4979,7 +4979,7 @@
           <p:cNvPr id="75" name="Straight Connector 74">
             <a:extLst>
               <a:ext uri="{FF2B5EF4-FFF2-40B4-BE49-F238E27FC236}">
-                <a16:creationId xmlns:a16="http://schemas.microsoft.com/office/drawing/2014/main" xmlns="" id="{E4E1C8CA-49DF-45D8-80A5-D5C8282EE927}"/>
+                <a16:creationId xmlns="" xmlns:a16="http://schemas.microsoft.com/office/drawing/2014/main" id="{E4E1C8CA-49DF-45D8-80A5-D5C8282EE927}"/>
               </a:ext>
             </a:extLst>
           </p:cNvPr>
@@ -5158,7 +5158,7 @@
           <p:cNvPr id="82" name="Straight Arrow Connector 81">
             <a:extLst>
               <a:ext uri="{FF2B5EF4-FFF2-40B4-BE49-F238E27FC236}">
-                <a16:creationId xmlns:a16="http://schemas.microsoft.com/office/drawing/2014/main" xmlns="" id="{7C9F21BC-13A9-471F-825A-2621FD36355F}"/>
+                <a16:creationId xmlns="" xmlns:a16="http://schemas.microsoft.com/office/drawing/2014/main" id="{7C9F21BC-13A9-471F-825A-2621FD36355F}"/>
               </a:ext>
             </a:extLst>
           </p:cNvPr>
@@ -5436,7 +5436,7 @@
           <p:cNvPr id="98" name="Straight Arrow Connector 97">
             <a:extLst>
               <a:ext uri="{FF2B5EF4-FFF2-40B4-BE49-F238E27FC236}">
-                <a16:creationId xmlns:a16="http://schemas.microsoft.com/office/drawing/2014/main" xmlns="" id="{7C9F21BC-13A9-471F-825A-2621FD36355F}"/>
+                <a16:creationId xmlns="" xmlns:a16="http://schemas.microsoft.com/office/drawing/2014/main" id="{7C9F21BC-13A9-471F-825A-2621FD36355F}"/>
               </a:ext>
             </a:extLst>
           </p:cNvPr>
@@ -5482,7 +5482,7 @@
           <p:cNvPr id="100" name="Straight Arrow Connector 99">
             <a:extLst>
               <a:ext uri="{FF2B5EF4-FFF2-40B4-BE49-F238E27FC236}">
-                <a16:creationId xmlns:a16="http://schemas.microsoft.com/office/drawing/2014/main" xmlns="" id="{7C9F21BC-13A9-471F-825A-2621FD36355F}"/>
+                <a16:creationId xmlns="" xmlns:a16="http://schemas.microsoft.com/office/drawing/2014/main" id="{7C9F21BC-13A9-471F-825A-2621FD36355F}"/>
               </a:ext>
             </a:extLst>
           </p:cNvPr>
@@ -5685,7 +5685,7 @@
           <p:cNvPr id="54" name="Straight Connector 53">
             <a:extLst>
               <a:ext uri="{FF2B5EF4-FFF2-40B4-BE49-F238E27FC236}">
-                <a16:creationId xmlns:a16="http://schemas.microsoft.com/office/drawing/2014/main" xmlns="" id="{E4E1C8CA-49DF-45D8-80A5-D5C8282EE927}"/>
+                <a16:creationId xmlns="" xmlns:a16="http://schemas.microsoft.com/office/drawing/2014/main" id="{E4E1C8CA-49DF-45D8-80A5-D5C8282EE927}"/>
               </a:ext>
             </a:extLst>
           </p:cNvPr>
@@ -5864,7 +5864,7 @@
           <p:cNvPr id="72" name="Straight Arrow Connector 71">
             <a:extLst>
               <a:ext uri="{FF2B5EF4-FFF2-40B4-BE49-F238E27FC236}">
-                <a16:creationId xmlns:a16="http://schemas.microsoft.com/office/drawing/2014/main" xmlns="" id="{7C9F21BC-13A9-471F-825A-2621FD36355F}"/>
+                <a16:creationId xmlns="" xmlns:a16="http://schemas.microsoft.com/office/drawing/2014/main" id="{7C9F21BC-13A9-471F-825A-2621FD36355F}"/>
               </a:ext>
             </a:extLst>
           </p:cNvPr>
@@ -6044,7 +6044,7 @@
           <p:cNvPr id="90" name="Straight Arrow Connector 89">
             <a:extLst>
               <a:ext uri="{FF2B5EF4-FFF2-40B4-BE49-F238E27FC236}">
-                <a16:creationId xmlns:a16="http://schemas.microsoft.com/office/drawing/2014/main" xmlns="" id="{7C9F21BC-13A9-471F-825A-2621FD36355F}"/>
+                <a16:creationId xmlns="" xmlns:a16="http://schemas.microsoft.com/office/drawing/2014/main" id="{7C9F21BC-13A9-471F-825A-2621FD36355F}"/>
               </a:ext>
             </a:extLst>
           </p:cNvPr>
@@ -6420,7 +6420,7 @@
           <p:cNvPr id="126" name="Straight Arrow Connector 125">
             <a:extLst>
               <a:ext uri="{FF2B5EF4-FFF2-40B4-BE49-F238E27FC236}">
-                <a16:creationId xmlns:a16="http://schemas.microsoft.com/office/drawing/2014/main" xmlns="" id="{7C9F21BC-13A9-471F-825A-2621FD36355F}"/>
+                <a16:creationId xmlns="" xmlns:a16="http://schemas.microsoft.com/office/drawing/2014/main" id="{7C9F21BC-13A9-471F-825A-2621FD36355F}"/>
               </a:ext>
             </a:extLst>
           </p:cNvPr>
@@ -6709,15 +6709,7 @@
                   <a:srgbClr val="7030A0"/>
                 </a:solidFill>
               </a:rPr>
-              <a:t>getCode</a:t>
-            </a:r>
-            <a:r>
-              <a:rPr lang="en-US" sz="1200" dirty="0" smtClean="0">
-                <a:solidFill>
-                  <a:srgbClr val="7030A0"/>
-                </a:solidFill>
-              </a:rPr>
-              <a:t>()</a:t>
+              <a:t>getCode()</a:t>
             </a:r>
             <a:endParaRPr lang="en-US" sz="1200" dirty="0">
               <a:solidFill>
@@ -6732,7 +6724,7 @@
           <p:cNvPr id="105" name="Straight Arrow Connector 104">
             <a:extLst>
               <a:ext uri="{FF2B5EF4-FFF2-40B4-BE49-F238E27FC236}">
-                <a16:creationId xmlns:a16="http://schemas.microsoft.com/office/drawing/2014/main" xmlns="" id="{7C9F21BC-13A9-471F-825A-2621FD36355F}"/>
+                <a16:creationId xmlns="" xmlns:a16="http://schemas.microsoft.com/office/drawing/2014/main" id="{7C9F21BC-13A9-471F-825A-2621FD36355F}"/>
               </a:ext>
             </a:extLst>
           </p:cNvPr>

</xml_diff>